<commit_message>
Clarified training features slide
</commit_message>
<xml_diff>
--- a/info/chord_training_and_perf.pptx
+++ b/info/chord_training_and_perf.pptx
@@ -11,8 +11,8 @@
     <p:sldId id="421" r:id="rId2"/>
     <p:sldId id="436" r:id="rId3"/>
     <p:sldId id="410" r:id="rId4"/>
-    <p:sldId id="274" r:id="rId5"/>
-    <p:sldId id="401" r:id="rId6"/>
+    <p:sldId id="401" r:id="rId5"/>
+    <p:sldId id="274" r:id="rId6"/>
     <p:sldId id="403" r:id="rId7"/>
     <p:sldId id="406" r:id="rId8"/>
     <p:sldId id="437" r:id="rId9"/>
@@ -553,7 +553,7 @@
           <a:p>
             <a:fld id="{3329FBAF-FE31-6A45-832C-24078933C6EA}" type="slidenum">
               <a:rPr lang="en-US" smtClean="0"/>
-              <a:t>5</a:t>
+              <a:t>4</a:t>
             </a:fld>
             <a:endParaRPr lang="en-US"/>
           </a:p>
@@ -6035,7 +6035,7 @@
           <p:cNvPr id="2" name="Title 1">
             <a:extLst>
               <a:ext uri="{FF2B5EF4-FFF2-40B4-BE49-F238E27FC236}">
-                <a16:creationId xmlns:a16="http://schemas.microsoft.com/office/drawing/2014/main" id="{75FF242F-A6C1-CA41-BED7-A761A8C434A5}"/>
+                <a16:creationId xmlns:a16="http://schemas.microsoft.com/office/drawing/2014/main" id="{03A14506-1654-9045-93C6-4A56197E043F}"/>
               </a:ext>
             </a:extLst>
           </p:cNvPr>
@@ -6053,409 +6053,7 @@
           <a:p>
             <a:r>
               <a:rPr lang="en-US" dirty="0"/>
-              <a:t>Random forest</a:t>
-            </a:r>
-          </a:p>
-        </p:txBody>
-      </p:sp>
-      <mc:AlternateContent xmlns:mc="http://schemas.openxmlformats.org/markup-compatibility/2006">
-        <mc:Choice xmlns:a14="http://schemas.microsoft.com/office/drawing/2010/main" Requires="a14">
-          <p:sp>
-            <p:nvSpPr>
-              <p:cNvPr id="127" name="Content Placeholder 126">
-                <a:extLst>
-                  <a:ext uri="{FF2B5EF4-FFF2-40B4-BE49-F238E27FC236}">
-                    <a16:creationId xmlns:a16="http://schemas.microsoft.com/office/drawing/2014/main" id="{E2F5F147-2CFD-FC47-9C69-43E6D34A57BA}"/>
-                  </a:ext>
-                </a:extLst>
-              </p:cNvPr>
-              <p:cNvSpPr>
-                <a:spLocks noGrp="1"/>
-              </p:cNvSpPr>
-              <p:nvPr>
-                <p:ph idx="4294967295"/>
-              </p:nvPr>
-            </p:nvSpPr>
-            <p:spPr>
-              <a:xfrm>
-                <a:off x="6096000" y="1452563"/>
-                <a:ext cx="5786437" cy="5099491"/>
-              </a:xfrm>
-            </p:spPr>
-            <p:txBody>
-              <a:bodyPr>
-                <a:normAutofit/>
-              </a:bodyPr>
-              <a:lstStyle/>
-              <a:p>
-                <a:r>
-                  <a:rPr lang="en-US" sz="2400" dirty="0"/>
-                  <a:t>Building one decision tree:</a:t>
-                </a:r>
-              </a:p>
-              <a:p>
-                <a:pPr lvl="1"/>
-                <a:r>
-                  <a:rPr lang="en-US" sz="2000" dirty="0"/>
-                  <a:t>Random subset of donors</a:t>
-                </a:r>
-              </a:p>
-              <a:p>
-                <a:pPr lvl="1"/>
-                <a:r>
-                  <a:rPr lang="en-US" sz="2000" dirty="0"/>
-                  <a:t>Random subset of features</a:t>
-                </a:r>
-              </a:p>
-              <a:p>
-                <a:pPr lvl="1"/>
-                <a:r>
-                  <a:rPr lang="en-US" sz="2000" dirty="0"/>
-                  <a:t>Determine feature value cutoffs for branching</a:t>
-                </a:r>
-              </a:p>
-              <a:p>
-                <a:pPr lvl="1"/>
-                <a:r>
-                  <a:rPr lang="en-US" sz="2000" dirty="0"/>
-                  <a:t>Repeat until terminal nodes are pure</a:t>
-                </a:r>
-              </a:p>
-              <a:p>
-                <a:pPr lvl="1"/>
-                <a:endParaRPr lang="en-US" sz="2000" dirty="0"/>
-              </a:p>
-              <a:p>
-                <a:r>
-                  <a:rPr lang="en-US" sz="2200" dirty="0"/>
-                  <a:t>Repeat for </a:t>
-                </a:r>
-                <a:r>
-                  <a:rPr lang="en-US" sz="2200" i="1" dirty="0"/>
-                  <a:t>n</a:t>
-                </a:r>
-                <a:r>
-                  <a:rPr lang="en-US" sz="2200" dirty="0"/>
-                  <a:t> trees</a:t>
-                </a:r>
-              </a:p>
-              <a:p>
-                <a:endParaRPr lang="en-US" dirty="0"/>
-              </a:p>
-              <a:p>
-                <a:r>
-                  <a:rPr lang="en-US" sz="2400" dirty="0"/>
-                  <a:t>Prediction for a new sample:</a:t>
-                </a:r>
-              </a:p>
-              <a:p>
-                <a:pPr lvl="1"/>
-                <a:r>
-                  <a:rPr lang="en-US" sz="2000" dirty="0"/>
-                  <a:t>Run feature values through each tree</a:t>
-                </a:r>
-              </a:p>
-              <a:p>
-                <a:pPr lvl="1"/>
-                <a:r>
-                  <a:rPr lang="en-US" sz="2000" dirty="0"/>
-                  <a:t>Each tree votes BRCA1/BRCA2/none</a:t>
-                </a:r>
-              </a:p>
-              <a:p>
-                <a:pPr lvl="1"/>
-                <a14:m>
-                  <m:oMath xmlns:m="http://schemas.openxmlformats.org/officeDocument/2006/math">
-                    <m:r>
-                      <m:rPr>
-                        <m:sty m:val="p"/>
-                      </m:rPr>
-                      <a:rPr lang="en-US" sz="2000" b="0" i="0" smtClean="0">
-                        <a:latin typeface="Cambria Math" panose="02040503050406030204" pitchFamily="18" charset="0"/>
-                      </a:rPr>
-                      <m:t>Probability</m:t>
-                    </m:r>
-                    <m:r>
-                      <a:rPr lang="en-US" sz="2000" b="0" i="0" smtClean="0">
-                        <a:latin typeface="Cambria Math" panose="02040503050406030204" pitchFamily="18" charset="0"/>
-                      </a:rPr>
-                      <m:t>=</m:t>
-                    </m:r>
-                    <m:f>
-                      <m:fPr>
-                        <m:ctrlPr>
-                          <a:rPr lang="en-US" sz="2000" b="0" i="1" smtClean="0">
-                            <a:latin typeface="Cambria Math" panose="02040503050406030204" pitchFamily="18" charset="0"/>
-                          </a:rPr>
-                        </m:ctrlPr>
-                      </m:fPr>
-                      <m:num>
-                        <m:r>
-                          <m:rPr>
-                            <m:sty m:val="p"/>
-                          </m:rPr>
-                          <a:rPr lang="en-US" sz="2000" b="0" i="0" smtClean="0">
-                            <a:latin typeface="Cambria Math" panose="02040503050406030204" pitchFamily="18" charset="0"/>
-                          </a:rPr>
-                          <m:t>C</m:t>
-                        </m:r>
-                        <m:r>
-                          <m:rPr>
-                            <m:sty m:val="p"/>
-                          </m:rPr>
-                          <a:rPr lang="en-US" sz="2000" b="0" i="0" smtClean="0">
-                            <a:latin typeface="Cambria Math" panose="02040503050406030204" pitchFamily="18" charset="0"/>
-                          </a:rPr>
-                          <m:t>lass</m:t>
-                        </m:r>
-                        <m:r>
-                          <a:rPr lang="en-US" sz="2000" b="0" i="0" smtClean="0">
-                            <a:latin typeface="Cambria Math" panose="02040503050406030204" pitchFamily="18" charset="0"/>
-                          </a:rPr>
-                          <m:t> </m:t>
-                        </m:r>
-                        <m:r>
-                          <m:rPr>
-                            <m:sty m:val="p"/>
-                          </m:rPr>
-                          <a:rPr lang="en-US" sz="2000" b="0" i="0" smtClean="0">
-                            <a:latin typeface="Cambria Math" panose="02040503050406030204" pitchFamily="18" charset="0"/>
-                          </a:rPr>
-                          <m:t>votes</m:t>
-                        </m:r>
-                      </m:num>
-                      <m:den>
-                        <m:r>
-                          <m:rPr>
-                            <m:sty m:val="p"/>
-                          </m:rPr>
-                          <a:rPr lang="en-US" sz="2000" b="0" i="0" smtClean="0">
-                            <a:latin typeface="Cambria Math" panose="02040503050406030204" pitchFamily="18" charset="0"/>
-                          </a:rPr>
-                          <m:t>Total</m:t>
-                        </m:r>
-                        <m:r>
-                          <a:rPr lang="en-US" sz="2000" b="0" i="0" smtClean="0">
-                            <a:latin typeface="Cambria Math" panose="02040503050406030204" pitchFamily="18" charset="0"/>
-                          </a:rPr>
-                          <m:t> </m:t>
-                        </m:r>
-                        <m:r>
-                          <m:rPr>
-                            <m:sty m:val="p"/>
-                          </m:rPr>
-                          <a:rPr lang="en-US" sz="2000" b="0" i="0" smtClean="0">
-                            <a:latin typeface="Cambria Math" panose="02040503050406030204" pitchFamily="18" charset="0"/>
-                          </a:rPr>
-                          <m:t>votes</m:t>
-                        </m:r>
-                      </m:den>
-                    </m:f>
-                    <m:r>
-                      <a:rPr lang="en-US" sz="2000" b="0" i="0" smtClean="0">
-                        <a:latin typeface="Cambria Math" panose="02040503050406030204" pitchFamily="18" charset="0"/>
-                      </a:rPr>
-                      <m:t> </m:t>
-                    </m:r>
-                  </m:oMath>
-                </a14:m>
-                <a:endParaRPr lang="en-US" sz="2000" dirty="0"/>
-              </a:p>
-              <a:p>
-                <a:pPr lvl="1"/>
-                <a:r>
-                  <a:rPr lang="en-US" sz="2000" dirty="0"/>
-                  <a:t>Probability of HRD = </a:t>
-                </a:r>
-                <a:r>
-                  <a:rPr lang="en-US" sz="1600" dirty="0"/>
-                  <a:t>P</a:t>
-                </a:r>
-                <a:r>
-                  <a:rPr lang="en-US" sz="2000" baseline="-25000" dirty="0"/>
-                  <a:t>BRCA1 deficient</a:t>
-                </a:r>
-                <a:r>
-                  <a:rPr lang="en-US" sz="2000" dirty="0"/>
-                  <a:t> + P</a:t>
-                </a:r>
-                <a:r>
-                  <a:rPr lang="en-US" sz="2000" baseline="-25000" dirty="0"/>
-                  <a:t>BRCA2 deficient</a:t>
-                </a:r>
-                <a:r>
-                  <a:rPr lang="en-US" sz="2000" dirty="0"/>
-                  <a:t> </a:t>
-                </a:r>
-              </a:p>
-            </p:txBody>
-          </p:sp>
-        </mc:Choice>
-        <mc:Fallback>
-          <p:sp>
-            <p:nvSpPr>
-              <p:cNvPr id="127" name="Content Placeholder 126">
-                <a:extLst>
-                  <a:ext uri="{FF2B5EF4-FFF2-40B4-BE49-F238E27FC236}">
-                    <a16:creationId xmlns:a16="http://schemas.microsoft.com/office/drawing/2014/main" id="{E2F5F147-2CFD-FC47-9C69-43E6D34A57BA}"/>
-                  </a:ext>
-                </a:extLst>
-              </p:cNvPr>
-              <p:cNvSpPr>
-                <a:spLocks noGrp="1" noRot="1" noChangeAspect="1" noMove="1" noResize="1" noEditPoints="1" noAdjustHandles="1" noChangeArrowheads="1" noChangeShapeType="1" noTextEdit="1"/>
-              </p:cNvSpPr>
-              <p:nvPr>
-                <p:ph idx="4294967295"/>
-              </p:nvPr>
-            </p:nvSpPr>
-            <p:spPr>
-              <a:xfrm>
-                <a:off x="6096000" y="1452563"/>
-                <a:ext cx="5786437" cy="5099491"/>
-              </a:xfrm>
-              <a:blipFill>
-                <a:blip r:embed="rId2"/>
-                <a:stretch>
-                  <a:fillRect l="-1535" t="-1241"/>
-                </a:stretch>
-              </a:blipFill>
-            </p:spPr>
-            <p:txBody>
-              <a:bodyPr/>
-              <a:lstStyle/>
-              <a:p>
-                <a:r>
-                  <a:rPr lang="en-US">
-                    <a:noFill/>
-                  </a:rPr>
-                  <a:t> </a:t>
-                </a:r>
-              </a:p>
-            </p:txBody>
-          </p:sp>
-        </mc:Fallback>
-      </mc:AlternateContent>
-      <p:pic>
-        <p:nvPicPr>
-          <p:cNvPr id="2050" name="Picture 2"/>
-          <p:cNvPicPr>
-            <a:picLocks noChangeAspect="1" noChangeArrowheads="1"/>
-          </p:cNvPicPr>
-          <p:nvPr/>
-        </p:nvPicPr>
-        <p:blipFill>
-          <a:blip r:embed="rId3">
-            <a:extLst>
-              <a:ext uri="{28A0092B-C50C-407E-A947-70E740481C1C}">
-                <a14:useLocalDpi xmlns:a14="http://schemas.microsoft.com/office/drawing/2010/main" val="0"/>
-              </a:ext>
-            </a:extLst>
-          </a:blip>
-          <a:srcRect/>
-          <a:stretch>
-            <a:fillRect/>
-          </a:stretch>
-        </p:blipFill>
-        <p:spPr bwMode="auto">
-          <a:xfrm>
-            <a:off x="770618" y="1546036"/>
-            <a:ext cx="4796745" cy="5177591"/>
-          </a:xfrm>
-          <a:prstGeom prst="rect">
-            <a:avLst/>
-          </a:prstGeom>
-          <a:noFill/>
-          <a:ln>
-            <a:noFill/>
-          </a:ln>
-          <a:effectLst/>
-          <a:extLst>
-            <a:ext uri="{909E8E84-426E-40DD-AFC4-6F175D3DCCD1}">
-              <a14:hiddenFill xmlns:a14="http://schemas.microsoft.com/office/drawing/2010/main">
-                <a:solidFill>
-                  <a:schemeClr val="accent1"/>
-                </a:solidFill>
-              </a14:hiddenFill>
-            </a:ext>
-            <a:ext uri="{91240B29-F687-4F45-9708-019B960494DF}">
-              <a14:hiddenLine xmlns:a14="http://schemas.microsoft.com/office/drawing/2010/main" w="9525">
-                <a:solidFill>
-                  <a:schemeClr val="tx1"/>
-                </a:solidFill>
-                <a:miter lim="800000"/>
-                <a:headEnd/>
-                <a:tailEnd/>
-              </a14:hiddenLine>
-            </a:ext>
-            <a:ext uri="{AF507438-7753-43E0-B8FC-AC1667EBCBE1}">
-              <a14:hiddenEffects xmlns:a14="http://schemas.microsoft.com/office/drawing/2010/main">
-                <a:effectLst>
-                  <a:outerShdw dist="35921" dir="2700000" algn="ctr" rotWithShape="0">
-                    <a:schemeClr val="bg2"/>
-                  </a:outerShdw>
-                </a:effectLst>
-              </a14:hiddenEffects>
-            </a:ext>
-          </a:extLst>
-        </p:spPr>
-      </p:pic>
-    </p:spTree>
-    <p:extLst>
-      <p:ext uri="{BB962C8B-B14F-4D97-AF65-F5344CB8AC3E}">
-        <p14:creationId xmlns:p14="http://schemas.microsoft.com/office/powerpoint/2010/main" val="2375098084"/>
-      </p:ext>
-    </p:extLst>
-  </p:cSld>
-  <p:clrMapOvr>
-    <a:masterClrMapping/>
-  </p:clrMapOvr>
-  <p:transition>
-    <p:fade/>
-  </p:transition>
-</p:sld>
-</file>
-
-<file path=ppt/slides/slide5.xml><?xml version="1.0" encoding="utf-8"?>
-<p:sld xmlns:a="http://schemas.openxmlformats.org/drawingml/2006/main" xmlns:r="http://schemas.openxmlformats.org/officeDocument/2006/relationships" xmlns:p="http://schemas.openxmlformats.org/presentationml/2006/main">
-  <p:cSld>
-    <p:spTree>
-      <p:nvGrpSpPr>
-        <p:cNvPr id="1" name=""/>
-        <p:cNvGrpSpPr/>
-        <p:nvPr/>
-      </p:nvGrpSpPr>
-      <p:grpSpPr>
-        <a:xfrm>
-          <a:off x="0" y="0"/>
-          <a:ext cx="0" cy="0"/>
-          <a:chOff x="0" y="0"/>
-          <a:chExt cx="0" cy="0"/>
-        </a:xfrm>
-      </p:grpSpPr>
-      <p:sp>
-        <p:nvSpPr>
-          <p:cNvPr id="2" name="Title 1">
-            <a:extLst>
-              <a:ext uri="{FF2B5EF4-FFF2-40B4-BE49-F238E27FC236}">
-                <a16:creationId xmlns:a16="http://schemas.microsoft.com/office/drawing/2014/main" id="{03A14506-1654-9045-93C6-4A56197E043F}"/>
-              </a:ext>
-            </a:extLst>
-          </p:cNvPr>
-          <p:cNvSpPr>
-            <a:spLocks noGrp="1"/>
-          </p:cNvSpPr>
-          <p:nvPr>
-            <p:ph type="title"/>
-          </p:nvPr>
-        </p:nvSpPr>
-        <p:spPr/>
-        <p:txBody>
-          <a:bodyPr/>
-          <a:lstStyle/>
-          <a:p>
-            <a:r>
-              <a:rPr lang="en-US" dirty="0"/>
-              <a:t>Features</a:t>
+              <a:t>Training features</a:t>
             </a:r>
           </a:p>
         </p:txBody>
@@ -7523,6 +7121,399 @@
 </p:sld>
 </file>
 
+<file path=ppt/slides/slide5.xml><?xml version="1.0" encoding="utf-8"?>
+<p:sld xmlns:a="http://schemas.openxmlformats.org/drawingml/2006/main" xmlns:r="http://schemas.openxmlformats.org/officeDocument/2006/relationships" xmlns:p="http://schemas.openxmlformats.org/presentationml/2006/main">
+  <p:cSld>
+    <p:spTree>
+      <p:nvGrpSpPr>
+        <p:cNvPr id="1" name=""/>
+        <p:cNvGrpSpPr/>
+        <p:nvPr/>
+      </p:nvGrpSpPr>
+      <p:grpSpPr>
+        <a:xfrm>
+          <a:off x="0" y="0"/>
+          <a:ext cx="0" cy="0"/>
+          <a:chOff x="0" y="0"/>
+          <a:chExt cx="0" cy="0"/>
+        </a:xfrm>
+      </p:grpSpPr>
+      <p:sp>
+        <p:nvSpPr>
+          <p:cNvPr id="2" name="Title 1">
+            <a:extLst>
+              <a:ext uri="{FF2B5EF4-FFF2-40B4-BE49-F238E27FC236}">
+                <a16:creationId xmlns:a16="http://schemas.microsoft.com/office/drawing/2014/main" id="{75FF242F-A6C1-CA41-BED7-A761A8C434A5}"/>
+              </a:ext>
+            </a:extLst>
+          </p:cNvPr>
+          <p:cNvSpPr>
+            <a:spLocks noGrp="1"/>
+          </p:cNvSpPr>
+          <p:nvPr>
+            <p:ph type="title"/>
+          </p:nvPr>
+        </p:nvSpPr>
+        <p:spPr/>
+        <p:txBody>
+          <a:bodyPr/>
+          <a:lstStyle/>
+          <a:p>
+            <a:r>
+              <a:rPr lang="en-US" dirty="0"/>
+              <a:t>Random forest</a:t>
+            </a:r>
+          </a:p>
+        </p:txBody>
+      </p:sp>
+      <mc:AlternateContent xmlns:mc="http://schemas.openxmlformats.org/markup-compatibility/2006" xmlns:a14="http://schemas.microsoft.com/office/drawing/2010/main">
+        <mc:Choice Requires="a14">
+          <p:sp>
+            <p:nvSpPr>
+              <p:cNvPr id="127" name="Content Placeholder 126">
+                <a:extLst>
+                  <a:ext uri="{FF2B5EF4-FFF2-40B4-BE49-F238E27FC236}">
+                    <a16:creationId xmlns:a16="http://schemas.microsoft.com/office/drawing/2014/main" id="{E2F5F147-2CFD-FC47-9C69-43E6D34A57BA}"/>
+                  </a:ext>
+                </a:extLst>
+              </p:cNvPr>
+              <p:cNvSpPr>
+                <a:spLocks noGrp="1"/>
+              </p:cNvSpPr>
+              <p:nvPr>
+                <p:ph idx="4294967295"/>
+              </p:nvPr>
+            </p:nvSpPr>
+            <p:spPr>
+              <a:xfrm>
+                <a:off x="6096000" y="1452563"/>
+                <a:ext cx="5786437" cy="5099491"/>
+              </a:xfrm>
+            </p:spPr>
+            <p:txBody>
+              <a:bodyPr>
+                <a:normAutofit/>
+              </a:bodyPr>
+              <a:lstStyle/>
+              <a:p>
+                <a:r>
+                  <a:rPr lang="en-US" sz="2400" dirty="0"/>
+                  <a:t>Building one decision tree:</a:t>
+                </a:r>
+              </a:p>
+              <a:p>
+                <a:pPr lvl="1"/>
+                <a:r>
+                  <a:rPr lang="en-US" sz="2000" dirty="0"/>
+                  <a:t>Random subset of donors</a:t>
+                </a:r>
+              </a:p>
+              <a:p>
+                <a:pPr lvl="1"/>
+                <a:r>
+                  <a:rPr lang="en-US" sz="2000" dirty="0"/>
+                  <a:t>Random subset of features</a:t>
+                </a:r>
+              </a:p>
+              <a:p>
+                <a:pPr lvl="1"/>
+                <a:r>
+                  <a:rPr lang="en-US" sz="2000" dirty="0"/>
+                  <a:t>Determine feature value cutoffs for branching</a:t>
+                </a:r>
+              </a:p>
+              <a:p>
+                <a:pPr lvl="1"/>
+                <a:r>
+                  <a:rPr lang="en-US" sz="2000" dirty="0"/>
+                  <a:t>Repeat until terminal nodes are pure</a:t>
+                </a:r>
+              </a:p>
+              <a:p>
+                <a:pPr lvl="1"/>
+                <a:endParaRPr lang="en-US" sz="2000" dirty="0"/>
+              </a:p>
+              <a:p>
+                <a:r>
+                  <a:rPr lang="en-US" sz="2200" dirty="0"/>
+                  <a:t>Repeat for </a:t>
+                </a:r>
+                <a:r>
+                  <a:rPr lang="en-US" sz="2200" i="1" dirty="0"/>
+                  <a:t>n</a:t>
+                </a:r>
+                <a:r>
+                  <a:rPr lang="en-US" sz="2200" dirty="0"/>
+                  <a:t> trees</a:t>
+                </a:r>
+              </a:p>
+              <a:p>
+                <a:endParaRPr lang="en-US" dirty="0"/>
+              </a:p>
+              <a:p>
+                <a:r>
+                  <a:rPr lang="en-US" sz="2400" dirty="0"/>
+                  <a:t>Prediction for a new sample:</a:t>
+                </a:r>
+              </a:p>
+              <a:p>
+                <a:pPr lvl="1"/>
+                <a:r>
+                  <a:rPr lang="en-US" sz="2000" dirty="0"/>
+                  <a:t>Run feature values through each tree</a:t>
+                </a:r>
+              </a:p>
+              <a:p>
+                <a:pPr lvl="1"/>
+                <a:r>
+                  <a:rPr lang="en-US" sz="2000" dirty="0"/>
+                  <a:t>Each tree votes BRCA1/BRCA2/none</a:t>
+                </a:r>
+              </a:p>
+              <a:p>
+                <a:pPr lvl="1"/>
+                <a14:m>
+                  <m:oMath xmlns:m="http://schemas.openxmlformats.org/officeDocument/2006/math">
+                    <m:r>
+                      <m:rPr>
+                        <m:sty m:val="p"/>
+                      </m:rPr>
+                      <a:rPr lang="en-US" sz="2000" b="0" i="0" smtClean="0">
+                        <a:latin typeface="Cambria Math" panose="02040503050406030204" pitchFamily="18" charset="0"/>
+                      </a:rPr>
+                      <m:t>Probability</m:t>
+                    </m:r>
+                    <m:r>
+                      <a:rPr lang="en-US" sz="2000" b="0" i="0" smtClean="0">
+                        <a:latin typeface="Cambria Math" panose="02040503050406030204" pitchFamily="18" charset="0"/>
+                      </a:rPr>
+                      <m:t>=</m:t>
+                    </m:r>
+                    <m:f>
+                      <m:fPr>
+                        <m:ctrlPr>
+                          <a:rPr lang="en-US" sz="2000" b="0" i="1" smtClean="0">
+                            <a:latin typeface="Cambria Math" panose="02040503050406030204" pitchFamily="18" charset="0"/>
+                          </a:rPr>
+                        </m:ctrlPr>
+                      </m:fPr>
+                      <m:num>
+                        <m:r>
+                          <m:rPr>
+                            <m:sty m:val="p"/>
+                          </m:rPr>
+                          <a:rPr lang="en-US" sz="2000" b="0" i="0" smtClean="0">
+                            <a:latin typeface="Cambria Math" panose="02040503050406030204" pitchFamily="18" charset="0"/>
+                          </a:rPr>
+                          <m:t>Class</m:t>
+                        </m:r>
+                        <m:r>
+                          <a:rPr lang="en-US" sz="2000" b="0" i="0" smtClean="0">
+                            <a:latin typeface="Cambria Math" panose="02040503050406030204" pitchFamily="18" charset="0"/>
+                          </a:rPr>
+                          <m:t> </m:t>
+                        </m:r>
+                        <m:r>
+                          <m:rPr>
+                            <m:sty m:val="p"/>
+                          </m:rPr>
+                          <a:rPr lang="en-US" sz="2000" b="0" i="0" smtClean="0">
+                            <a:latin typeface="Cambria Math" panose="02040503050406030204" pitchFamily="18" charset="0"/>
+                          </a:rPr>
+                          <m:t>votes</m:t>
+                        </m:r>
+                      </m:num>
+                      <m:den>
+                        <m:r>
+                          <m:rPr>
+                            <m:sty m:val="p"/>
+                          </m:rPr>
+                          <a:rPr lang="en-US" sz="2000" b="0" i="0" smtClean="0">
+                            <a:latin typeface="Cambria Math" panose="02040503050406030204" pitchFamily="18" charset="0"/>
+                          </a:rPr>
+                          <m:t>Total</m:t>
+                        </m:r>
+                        <m:r>
+                          <a:rPr lang="en-US" sz="2000" b="0" i="0" smtClean="0">
+                            <a:latin typeface="Cambria Math" panose="02040503050406030204" pitchFamily="18" charset="0"/>
+                          </a:rPr>
+                          <m:t> </m:t>
+                        </m:r>
+                        <m:r>
+                          <m:rPr>
+                            <m:sty m:val="p"/>
+                          </m:rPr>
+                          <a:rPr lang="en-US" sz="2000" b="0" i="0" smtClean="0">
+                            <a:latin typeface="Cambria Math" panose="02040503050406030204" pitchFamily="18" charset="0"/>
+                          </a:rPr>
+                          <m:t>votes</m:t>
+                        </m:r>
+                      </m:den>
+                    </m:f>
+                    <m:r>
+                      <a:rPr lang="en-US" sz="2000" b="0" i="0" smtClean="0">
+                        <a:latin typeface="Cambria Math" panose="02040503050406030204" pitchFamily="18" charset="0"/>
+                      </a:rPr>
+                      <m:t> </m:t>
+                    </m:r>
+                  </m:oMath>
+                </a14:m>
+                <a:endParaRPr lang="en-US" sz="2000" dirty="0"/>
+              </a:p>
+              <a:p>
+                <a:pPr lvl="1"/>
+                <a:r>
+                  <a:rPr lang="en-US" sz="2000" dirty="0"/>
+                  <a:t>Probability of HRD = </a:t>
+                </a:r>
+                <a:r>
+                  <a:rPr lang="en-US" sz="1600" dirty="0"/>
+                  <a:t>P</a:t>
+                </a:r>
+                <a:r>
+                  <a:rPr lang="en-US" sz="2000" baseline="-25000" dirty="0"/>
+                  <a:t>BRCA1 deficient</a:t>
+                </a:r>
+                <a:r>
+                  <a:rPr lang="en-US" sz="2000" dirty="0"/>
+                  <a:t> + P</a:t>
+                </a:r>
+                <a:r>
+                  <a:rPr lang="en-US" sz="2000" baseline="-25000" dirty="0"/>
+                  <a:t>BRCA2 deficient</a:t>
+                </a:r>
+                <a:r>
+                  <a:rPr lang="en-US" sz="2000" dirty="0"/>
+                  <a:t> </a:t>
+                </a:r>
+              </a:p>
+            </p:txBody>
+          </p:sp>
+        </mc:Choice>
+        <mc:Fallback xmlns="">
+          <p:sp>
+            <p:nvSpPr>
+              <p:cNvPr id="127" name="Content Placeholder 126">
+                <a:extLst>
+                  <a:ext uri="{FF2B5EF4-FFF2-40B4-BE49-F238E27FC236}">
+                    <a16:creationId xmlns:a16="http://schemas.microsoft.com/office/drawing/2014/main" id="{E2F5F147-2CFD-FC47-9C69-43E6D34A57BA}"/>
+                  </a:ext>
+                </a:extLst>
+              </p:cNvPr>
+              <p:cNvSpPr>
+                <a:spLocks noGrp="1" noRot="1" noChangeAspect="1" noMove="1" noResize="1" noEditPoints="1" noAdjustHandles="1" noChangeArrowheads="1" noChangeShapeType="1" noTextEdit="1"/>
+              </p:cNvSpPr>
+              <p:nvPr>
+                <p:ph idx="4294967295"/>
+              </p:nvPr>
+            </p:nvSpPr>
+            <p:spPr>
+              <a:xfrm>
+                <a:off x="6096000" y="1452563"/>
+                <a:ext cx="5786437" cy="5099491"/>
+              </a:xfrm>
+              <a:blipFill>
+                <a:blip r:embed="rId2"/>
+                <a:stretch>
+                  <a:fillRect l="-1535" t="-1241"/>
+                </a:stretch>
+              </a:blipFill>
+            </p:spPr>
+            <p:txBody>
+              <a:bodyPr/>
+              <a:lstStyle/>
+              <a:p>
+                <a:r>
+                  <a:rPr lang="en-US">
+                    <a:noFill/>
+                  </a:rPr>
+                  <a:t> </a:t>
+                </a:r>
+              </a:p>
+            </p:txBody>
+          </p:sp>
+        </mc:Fallback>
+      </mc:AlternateContent>
+      <p:pic>
+        <p:nvPicPr>
+          <p:cNvPr id="2050" name="Picture 2"/>
+          <p:cNvPicPr>
+            <a:picLocks noChangeAspect="1" noChangeArrowheads="1"/>
+          </p:cNvPicPr>
+          <p:nvPr/>
+        </p:nvPicPr>
+        <p:blipFill>
+          <a:blip r:embed="rId3">
+            <a:extLst>
+              <a:ext uri="{28A0092B-C50C-407E-A947-70E740481C1C}">
+                <a14:useLocalDpi xmlns:a14="http://schemas.microsoft.com/office/drawing/2010/main" val="0"/>
+              </a:ext>
+            </a:extLst>
+          </a:blip>
+          <a:srcRect/>
+          <a:stretch>
+            <a:fillRect/>
+          </a:stretch>
+        </p:blipFill>
+        <p:spPr bwMode="auto">
+          <a:xfrm>
+            <a:off x="770618" y="1546036"/>
+            <a:ext cx="4796745" cy="5177591"/>
+          </a:xfrm>
+          <a:prstGeom prst="rect">
+            <a:avLst/>
+          </a:prstGeom>
+          <a:noFill/>
+          <a:ln>
+            <a:noFill/>
+          </a:ln>
+          <a:effectLst/>
+          <a:extLst>
+            <a:ext uri="{909E8E84-426E-40DD-AFC4-6F175D3DCCD1}">
+              <a14:hiddenFill xmlns:a14="http://schemas.microsoft.com/office/drawing/2010/main">
+                <a:solidFill>
+                  <a:schemeClr val="accent1"/>
+                </a:solidFill>
+              </a14:hiddenFill>
+            </a:ext>
+            <a:ext uri="{91240B29-F687-4F45-9708-019B960494DF}">
+              <a14:hiddenLine xmlns:a14="http://schemas.microsoft.com/office/drawing/2010/main" w="9525">
+                <a:solidFill>
+                  <a:schemeClr val="tx1"/>
+                </a:solidFill>
+                <a:miter lim="800000"/>
+                <a:headEnd/>
+                <a:tailEnd/>
+              </a14:hiddenLine>
+            </a:ext>
+            <a:ext uri="{AF507438-7753-43E0-B8FC-AC1667EBCBE1}">
+              <a14:hiddenEffects xmlns:a14="http://schemas.microsoft.com/office/drawing/2010/main">
+                <a:effectLst>
+                  <a:outerShdw dist="35921" dir="2700000" algn="ctr" rotWithShape="0">
+                    <a:schemeClr val="bg2"/>
+                  </a:outerShdw>
+                </a:effectLst>
+              </a14:hiddenEffects>
+            </a:ext>
+          </a:extLst>
+        </p:spPr>
+      </p:pic>
+    </p:spTree>
+    <p:extLst>
+      <p:ext uri="{BB962C8B-B14F-4D97-AF65-F5344CB8AC3E}">
+        <p14:creationId xmlns:p14="http://schemas.microsoft.com/office/powerpoint/2010/main" val="2375098084"/>
+      </p:ext>
+    </p:extLst>
+  </p:cSld>
+  <p:clrMapOvr>
+    <a:masterClrMapping/>
+  </p:clrMapOvr>
+  <p:transition>
+    <p:fade/>
+  </p:transition>
+</p:sld>
+</file>
+
 <file path=ppt/slides/slide6.xml><?xml version="1.0" encoding="utf-8"?>
 <p:sld xmlns:a="http://schemas.openxmlformats.org/drawingml/2006/main" xmlns:r="http://schemas.openxmlformats.org/officeDocument/2006/relationships" xmlns:p="http://schemas.openxmlformats.org/presentationml/2006/main">
   <p:cSld>

</xml_diff>